<commit_message>
chap 5. SQL Server Theory
</commit_message>
<xml_diff>
--- a/1. Document/Slides/40-Cách cài đặt và sử dụng Microsoft SQL Server.pptx
+++ b/1. Document/Slides/40-Cách cài đặt và sử dụng Microsoft SQL Server.pptx
@@ -241,7 +241,7 @@
           <a:p>
             <a:fld id="{749F7025-33D9-4E9F-9955-A14222A03D05}" type="datetimeFigureOut">
               <a:rPr lang="en-US" smtClean="0"/>
-              <a:t>8/29/2021</a:t>
+              <a:t>2/24/2025</a:t>
             </a:fld>
             <a:endParaRPr lang="en-US"/>
           </a:p>
@@ -636,6 +636,307 @@
           <a:bodyPr/>
           <a:lstStyle/>
           <a:p>
+            <a:r>
+              <a:rPr lang="en-US" dirty="0"/>
+              <a:t>- </a:t>
+            </a:r>
+            <a:r>
+              <a:rPr lang="vi-VN" sz="1200" b="1" kern="0" dirty="0">
+                <a:solidFill>
+                  <a:srgbClr val="002060"/>
+                </a:solidFill>
+                <a:latin typeface="Cambria" panose="02040503050406030204" pitchFamily="18" charset="0"/>
+              </a:rPr>
+              <a:t>Store Procedure</a:t>
+            </a:r>
+            <a:r>
+              <a:rPr lang="en-US" sz="1200" b="1" kern="0" dirty="0">
+                <a:solidFill>
+                  <a:srgbClr val="002060"/>
+                </a:solidFill>
+                <a:latin typeface="Cambria" panose="02040503050406030204" pitchFamily="18" charset="0"/>
+              </a:rPr>
+              <a:t> :</a:t>
+            </a:r>
+            <a:r>
+              <a:rPr lang="en-US" dirty="0"/>
+              <a:t>1 hàm làm gì đấy bằng </a:t>
+            </a:r>
+            <a:r>
+              <a:rPr lang="en-US" dirty="0" err="1"/>
+              <a:t>sql</a:t>
+            </a:r>
+            <a:endParaRPr lang="en-US" dirty="0"/>
+          </a:p>
+        </p:txBody>
+      </p:sp>
+      <p:sp>
+        <p:nvSpPr>
+          <p:cNvPr id="4" name="Slide Number Placeholder 3"/>
+          <p:cNvSpPr>
+            <a:spLocks noGrp="1"/>
+          </p:cNvSpPr>
+          <p:nvPr>
+            <p:ph type="sldNum" sz="quarter" idx="5"/>
+          </p:nvPr>
+        </p:nvSpPr>
+        <p:spPr/>
+        <p:txBody>
+          <a:bodyPr/>
+          <a:lstStyle/>
+          <a:p>
+            <a:fld id="{46D3E3EA-CC6A-448F-83C3-9A526F33CF9E}" type="slidenum">
+              <a:rPr lang="en-US" smtClean="0"/>
+              <a:t>25</a:t>
+            </a:fld>
+            <a:endParaRPr lang="en-US"/>
+          </a:p>
+        </p:txBody>
+      </p:sp>
+    </p:spTree>
+    <p:extLst>
+      <p:ext uri="{BB962C8B-B14F-4D97-AF65-F5344CB8AC3E}">
+        <p14:creationId xmlns:p14="http://schemas.microsoft.com/office/powerpoint/2010/main" val="2580654300"/>
+      </p:ext>
+    </p:extLst>
+  </p:cSld>
+  <p:clrMapOvr>
+    <a:masterClrMapping/>
+  </p:clrMapOvr>
+</p:notes>
+</file>
+
+<file path=ppt/notesSlides/notesSlide3.xml><?xml version="1.0" encoding="utf-8"?>
+<p:notes xmlns:a="http://schemas.openxmlformats.org/drawingml/2006/main" xmlns:r="http://schemas.openxmlformats.org/officeDocument/2006/relationships" xmlns:p="http://schemas.openxmlformats.org/presentationml/2006/main">
+  <p:cSld>
+    <p:spTree>
+      <p:nvGrpSpPr>
+        <p:cNvPr id="1" name=""/>
+        <p:cNvGrpSpPr/>
+        <p:nvPr/>
+      </p:nvGrpSpPr>
+      <p:grpSpPr>
+        <a:xfrm>
+          <a:off x="0" y="0"/>
+          <a:ext cx="0" cy="0"/>
+          <a:chOff x="0" y="0"/>
+          <a:chExt cx="0" cy="0"/>
+        </a:xfrm>
+      </p:grpSpPr>
+      <p:sp>
+        <p:nvSpPr>
+          <p:cNvPr id="2" name="Slide Image Placeholder 1"/>
+          <p:cNvSpPr>
+            <a:spLocks noGrp="1" noRot="1" noChangeAspect="1"/>
+          </p:cNvSpPr>
+          <p:nvPr>
+            <p:ph type="sldImg"/>
+          </p:nvPr>
+        </p:nvSpPr>
+        <p:spPr/>
+      </p:sp>
+      <p:sp>
+        <p:nvSpPr>
+          <p:cNvPr id="3" name="Notes Placeholder 2"/>
+          <p:cNvSpPr>
+            <a:spLocks noGrp="1"/>
+          </p:cNvSpPr>
+          <p:nvPr>
+            <p:ph type="body" idx="1"/>
+          </p:nvPr>
+        </p:nvSpPr>
+        <p:spPr/>
+        <p:txBody>
+          <a:bodyPr/>
+          <a:lstStyle/>
+          <a:p>
+            <a:r>
+              <a:rPr lang="en-US" sz="1200" dirty="0">
+                <a:latin typeface="Cambria" panose="02040503050406030204" pitchFamily="18" charset="0"/>
+              </a:rPr>
+              <a:t>Detach: ngắt kết nối </a:t>
+            </a:r>
+            <a:r>
+              <a:rPr lang="en-US" sz="1200" dirty="0" err="1">
+                <a:latin typeface="Cambria" panose="02040503050406030204" pitchFamily="18" charset="0"/>
+              </a:rPr>
+              <a:t>csdl</a:t>
+            </a:r>
+            <a:endParaRPr lang="en-US" dirty="0"/>
+          </a:p>
+        </p:txBody>
+      </p:sp>
+      <p:sp>
+        <p:nvSpPr>
+          <p:cNvPr id="4" name="Slide Number Placeholder 3"/>
+          <p:cNvSpPr>
+            <a:spLocks noGrp="1"/>
+          </p:cNvSpPr>
+          <p:nvPr>
+            <p:ph type="sldNum" sz="quarter" idx="5"/>
+          </p:nvPr>
+        </p:nvSpPr>
+        <p:spPr/>
+        <p:txBody>
+          <a:bodyPr/>
+          <a:lstStyle/>
+          <a:p>
+            <a:fld id="{46D3E3EA-CC6A-448F-83C3-9A526F33CF9E}" type="slidenum">
+              <a:rPr lang="en-US" smtClean="0"/>
+              <a:t>30</a:t>
+            </a:fld>
+            <a:endParaRPr lang="en-US"/>
+          </a:p>
+        </p:txBody>
+      </p:sp>
+    </p:spTree>
+    <p:extLst>
+      <p:ext uri="{BB962C8B-B14F-4D97-AF65-F5344CB8AC3E}">
+        <p14:creationId xmlns:p14="http://schemas.microsoft.com/office/powerpoint/2010/main" val="1780521583"/>
+      </p:ext>
+    </p:extLst>
+  </p:cSld>
+  <p:clrMapOvr>
+    <a:masterClrMapping/>
+  </p:clrMapOvr>
+</p:notes>
+</file>
+
+<file path=ppt/notesSlides/notesSlide4.xml><?xml version="1.0" encoding="utf-8"?>
+<p:notes xmlns:a="http://schemas.openxmlformats.org/drawingml/2006/main" xmlns:r="http://schemas.openxmlformats.org/officeDocument/2006/relationships" xmlns:p="http://schemas.openxmlformats.org/presentationml/2006/main">
+  <p:cSld>
+    <p:spTree>
+      <p:nvGrpSpPr>
+        <p:cNvPr id="1" name=""/>
+        <p:cNvGrpSpPr/>
+        <p:nvPr/>
+      </p:nvGrpSpPr>
+      <p:grpSpPr>
+        <a:xfrm>
+          <a:off x="0" y="0"/>
+          <a:ext cx="0" cy="0"/>
+          <a:chOff x="0" y="0"/>
+          <a:chExt cx="0" cy="0"/>
+        </a:xfrm>
+      </p:grpSpPr>
+      <p:sp>
+        <p:nvSpPr>
+          <p:cNvPr id="2" name="Slide Image Placeholder 1"/>
+          <p:cNvSpPr>
+            <a:spLocks noGrp="1" noRot="1" noChangeAspect="1"/>
+          </p:cNvSpPr>
+          <p:nvPr>
+            <p:ph type="sldImg"/>
+          </p:nvPr>
+        </p:nvSpPr>
+        <p:spPr/>
+      </p:sp>
+      <p:sp>
+        <p:nvSpPr>
+          <p:cNvPr id="3" name="Notes Placeholder 2"/>
+          <p:cNvSpPr>
+            <a:spLocks noGrp="1"/>
+          </p:cNvSpPr>
+          <p:nvPr>
+            <p:ph type="body" idx="1"/>
+          </p:nvPr>
+        </p:nvSpPr>
+        <p:spPr/>
+        <p:txBody>
+          <a:bodyPr/>
+          <a:lstStyle/>
+          <a:p>
+            <a:r>
+              <a:rPr lang="en-US" dirty="0"/>
+              <a:t>Attach </a:t>
+            </a:r>
+            <a:r>
+              <a:rPr lang="en-US"/>
+              <a:t>: kết nối lại</a:t>
+            </a:r>
+          </a:p>
+        </p:txBody>
+      </p:sp>
+      <p:sp>
+        <p:nvSpPr>
+          <p:cNvPr id="4" name="Slide Number Placeholder 3"/>
+          <p:cNvSpPr>
+            <a:spLocks noGrp="1"/>
+          </p:cNvSpPr>
+          <p:nvPr>
+            <p:ph type="sldNum" sz="quarter" idx="5"/>
+          </p:nvPr>
+        </p:nvSpPr>
+        <p:spPr/>
+        <p:txBody>
+          <a:bodyPr/>
+          <a:lstStyle/>
+          <a:p>
+            <a:fld id="{46D3E3EA-CC6A-448F-83C3-9A526F33CF9E}" type="slidenum">
+              <a:rPr lang="en-US" smtClean="0"/>
+              <a:t>33</a:t>
+            </a:fld>
+            <a:endParaRPr lang="en-US"/>
+          </a:p>
+        </p:txBody>
+      </p:sp>
+    </p:spTree>
+    <p:extLst>
+      <p:ext uri="{BB962C8B-B14F-4D97-AF65-F5344CB8AC3E}">
+        <p14:creationId xmlns:p14="http://schemas.microsoft.com/office/powerpoint/2010/main" val="135620556"/>
+      </p:ext>
+    </p:extLst>
+  </p:cSld>
+  <p:clrMapOvr>
+    <a:masterClrMapping/>
+  </p:clrMapOvr>
+</p:notes>
+</file>
+
+<file path=ppt/notesSlides/notesSlide5.xml><?xml version="1.0" encoding="utf-8"?>
+<p:notes xmlns:a="http://schemas.openxmlformats.org/drawingml/2006/main" xmlns:r="http://schemas.openxmlformats.org/officeDocument/2006/relationships" xmlns:p="http://schemas.openxmlformats.org/presentationml/2006/main">
+  <p:cSld>
+    <p:spTree>
+      <p:nvGrpSpPr>
+        <p:cNvPr id="1" name=""/>
+        <p:cNvGrpSpPr/>
+        <p:nvPr/>
+      </p:nvGrpSpPr>
+      <p:grpSpPr>
+        <a:xfrm>
+          <a:off x="0" y="0"/>
+          <a:ext cx="0" cy="0"/>
+          <a:chOff x="0" y="0"/>
+          <a:chExt cx="0" cy="0"/>
+        </a:xfrm>
+      </p:grpSpPr>
+      <p:sp>
+        <p:nvSpPr>
+          <p:cNvPr id="2" name="Slide Image Placeholder 1"/>
+          <p:cNvSpPr>
+            <a:spLocks noGrp="1" noRot="1" noChangeAspect="1"/>
+          </p:cNvSpPr>
+          <p:nvPr>
+            <p:ph type="sldImg"/>
+          </p:nvPr>
+        </p:nvSpPr>
+        <p:spPr/>
+      </p:sp>
+      <p:sp>
+        <p:nvSpPr>
+          <p:cNvPr id="3" name="Notes Placeholder 2"/>
+          <p:cNvSpPr>
+            <a:spLocks noGrp="1"/>
+          </p:cNvSpPr>
+          <p:nvPr>
+            <p:ph type="body" idx="1"/>
+          </p:nvPr>
+        </p:nvSpPr>
+        <p:spPr/>
+        <p:txBody>
+          <a:bodyPr/>
+          <a:lstStyle/>
+          <a:p>
             <a:endParaRPr lang="en-US"/>
           </a:p>
         </p:txBody>
@@ -855,7 +1156,7 @@
           <a:p>
             <a:fld id="{1ADF62C2-72EA-4953-A1D6-568F980002B8}" type="datetimeFigureOut">
               <a:rPr lang="en-US" smtClean="0"/>
-              <a:t>8/29/2021</a:t>
+              <a:t>2/24/2025</a:t>
             </a:fld>
             <a:endParaRPr lang="en-US"/>
           </a:p>
@@ -1023,7 +1324,7 @@
           <a:p>
             <a:fld id="{1ADF62C2-72EA-4953-A1D6-568F980002B8}" type="datetimeFigureOut">
               <a:rPr lang="en-US" smtClean="0"/>
-              <a:t>8/29/2021</a:t>
+              <a:t>2/24/2025</a:t>
             </a:fld>
             <a:endParaRPr lang="en-US"/>
           </a:p>
@@ -1201,7 +1502,7 @@
           <a:p>
             <a:fld id="{1ADF62C2-72EA-4953-A1D6-568F980002B8}" type="datetimeFigureOut">
               <a:rPr lang="en-US" smtClean="0"/>
-              <a:t>8/29/2021</a:t>
+              <a:t>2/24/2025</a:t>
             </a:fld>
             <a:endParaRPr lang="en-US"/>
           </a:p>
@@ -1833,7 +2134,7 @@
           <a:p>
             <a:fld id="{1ADF62C2-72EA-4953-A1D6-568F980002B8}" type="datetimeFigureOut">
               <a:rPr lang="en-US" smtClean="0"/>
-              <a:t>8/29/2021</a:t>
+              <a:t>2/24/2025</a:t>
             </a:fld>
             <a:endParaRPr lang="en-US"/>
           </a:p>
@@ -2118,7 +2419,7 @@
           <a:p>
             <a:fld id="{1ADF62C2-72EA-4953-A1D6-568F980002B8}" type="datetimeFigureOut">
               <a:rPr lang="en-US" smtClean="0"/>
-              <a:t>8/29/2021</a:t>
+              <a:t>2/24/2025</a:t>
             </a:fld>
             <a:endParaRPr lang="en-US"/>
           </a:p>
@@ -2537,7 +2838,7 @@
           <a:p>
             <a:fld id="{1ADF62C2-72EA-4953-A1D6-568F980002B8}" type="datetimeFigureOut">
               <a:rPr lang="en-US" smtClean="0"/>
-              <a:t>8/29/2021</a:t>
+              <a:t>2/24/2025</a:t>
             </a:fld>
             <a:endParaRPr lang="en-US"/>
           </a:p>
@@ -2654,7 +2955,7 @@
           <a:p>
             <a:fld id="{1ADF62C2-72EA-4953-A1D6-568F980002B8}" type="datetimeFigureOut">
               <a:rPr lang="en-US" smtClean="0"/>
-              <a:t>8/29/2021</a:t>
+              <a:t>2/24/2025</a:t>
             </a:fld>
             <a:endParaRPr lang="en-US"/>
           </a:p>
@@ -2749,7 +3050,7 @@
           <a:p>
             <a:fld id="{1ADF62C2-72EA-4953-A1D6-568F980002B8}" type="datetimeFigureOut">
               <a:rPr lang="en-US" smtClean="0"/>
-              <a:t>8/29/2021</a:t>
+              <a:t>2/24/2025</a:t>
             </a:fld>
             <a:endParaRPr lang="en-US"/>
           </a:p>
@@ -3024,7 +3325,7 @@
           <a:p>
             <a:fld id="{1ADF62C2-72EA-4953-A1D6-568F980002B8}" type="datetimeFigureOut">
               <a:rPr lang="en-US" smtClean="0"/>
-              <a:t>8/29/2021</a:t>
+              <a:t>2/24/2025</a:t>
             </a:fld>
             <a:endParaRPr lang="en-US"/>
           </a:p>
@@ -3276,7 +3577,7 @@
           <a:p>
             <a:fld id="{1ADF62C2-72EA-4953-A1D6-568F980002B8}" type="datetimeFigureOut">
               <a:rPr lang="en-US" smtClean="0"/>
-              <a:t>8/29/2021</a:t>
+              <a:t>2/24/2025</a:t>
             </a:fld>
             <a:endParaRPr lang="en-US"/>
           </a:p>
@@ -3487,7 +3788,7 @@
           <a:p>
             <a:fld id="{1ADF62C2-72EA-4953-A1D6-568F980002B8}" type="datetimeFigureOut">
               <a:rPr lang="en-US" smtClean="0"/>
-              <a:t>8/29/2021</a:t>
+              <a:t>2/24/2025</a:t>
             </a:fld>
             <a:endParaRPr lang="en-US"/>
           </a:p>
@@ -14394,7 +14695,7 @@
                 <a:defRPr/>
               </a:pPr>
               <a:r>
-                <a:rPr lang="vi-VN" sz="2400" b="1" kern="0">
+                <a:rPr lang="vi-VN" sz="2400" b="1" kern="0" dirty="0">
                   <a:solidFill>
                     <a:srgbClr val="002060"/>
                   </a:solidFill>
@@ -14871,7 +15172,7 @@
           <p:nvPr/>
         </p:nvPicPr>
         <p:blipFill>
-          <a:blip r:embed="rId2"/>
+          <a:blip r:embed="rId3"/>
           <a:stretch>
             <a:fillRect/>
           </a:stretch>
@@ -19456,7 +19757,7 @@
           <p:nvPr/>
         </p:nvPicPr>
         <p:blipFill rotWithShape="1">
-          <a:blip r:embed="rId2"/>
+          <a:blip r:embed="rId3"/>
           <a:srcRect r="54099" b="34375"/>
           <a:stretch/>
         </p:blipFill>
@@ -19493,7 +19794,7 @@
           <a:lstStyle/>
           <a:p>
             <a:r>
-              <a:rPr lang="en-US" sz="2400">
+              <a:rPr lang="en-US" sz="2400" dirty="0">
                 <a:latin typeface="Cambria" panose="02040503050406030204" pitchFamily="18" charset="0"/>
               </a:rPr>
               <a:t>Để sao lưu có nhiều cách. Ta có thể bấm chuột phải vào CSDL/ chọn Tasks/ chọn Detach:</a:t>
@@ -21140,7 +21441,7 @@
           <p:nvPr/>
         </p:nvPicPr>
         <p:blipFill rotWithShape="1">
-          <a:blip r:embed="rId2"/>
+          <a:blip r:embed="rId3"/>
           <a:srcRect l="366" t="3125" r="74216" b="47917"/>
           <a:stretch/>
         </p:blipFill>
@@ -21163,7 +21464,7 @@
           <p:nvPr/>
         </p:nvPicPr>
         <p:blipFill>
-          <a:blip r:embed="rId3"/>
+          <a:blip r:embed="rId4"/>
           <a:stretch>
             <a:fillRect/>
           </a:stretch>

</xml_diff>